<commit_message>
Updates to the 1-May-2012 presentation to CMAP
</commit_message>
<xml_diff>
--- a/SlideDeck/20120501/AutomatedTesting_with_NDbUnit.pptx
+++ b/SlideDeck/20120501/AutomatedTesting_with_NDbUnit.pptx
@@ -247,7 +247,7 @@
             <a:fld id="{EA6D1A69-4642-440C-B4DA-A3DDEA39507F}" type="datetimeFigureOut">
               <a:rPr lang="en-US" smtClean="0"/>
               <a:pPr/>
-              <a:t>4/29/2012</a:t>
+              <a:t>5/9/2012</a:t>
             </a:fld>
             <a:endParaRPr lang="en-US"/>
           </a:p>
@@ -878,14 +878,749 @@
           <a:lstStyle/>
           <a:p>
             <a:pPr eaLnBrk="1" hangingPunct="1"/>
-            <a:endParaRPr lang="en-US" smtClean="0">
+            <a:r>
+              <a:rPr lang="en-US" dirty="0" smtClean="0">
+                <a:latin typeface="Arial" pitchFamily="34" charset="0"/>
+                <a:ea typeface="ＭＳ Ｐゴシック" pitchFamily="34" charset="-128"/>
+              </a:rPr>
+              <a:t>The primary thing to know, we are talking about automated testing.</a:t>
+            </a:r>
+          </a:p>
+          <a:p>
+            <a:pPr eaLnBrk="1" hangingPunct="1"/>
+            <a:endParaRPr lang="en-US" dirty="0">
               <a:latin typeface="Arial" pitchFamily="34" charset="0"/>
               <a:ea typeface="ＭＳ Ｐゴシック" pitchFamily="34" charset="-128"/>
             </a:endParaRPr>
           </a:p>
+          <a:p>
+            <a:pPr eaLnBrk="1" hangingPunct="1"/>
+            <a:r>
+              <a:rPr lang="en-US" dirty="0" smtClean="0">
+                <a:latin typeface="Arial" pitchFamily="34" charset="0"/>
+                <a:ea typeface="ＭＳ Ｐゴシック" pitchFamily="34" charset="-128"/>
+              </a:rPr>
+              <a:t>Automated testing implies:</a:t>
+            </a:r>
+          </a:p>
+          <a:p>
+            <a:pPr marL="228600" indent="-228600" eaLnBrk="1" hangingPunct="1">
+              <a:buAutoNum type="arabicPeriod"/>
+            </a:pPr>
+            <a:r>
+              <a:rPr lang="en-US" dirty="0" smtClean="0">
+                <a:latin typeface="Arial" pitchFamily="34" charset="0"/>
+                <a:ea typeface="ＭＳ Ｐゴシック" pitchFamily="34" charset="-128"/>
+              </a:rPr>
+              <a:t>Require zero setup or configuration, or only one-time setup and configuration</a:t>
+            </a:r>
+          </a:p>
+          <a:p>
+            <a:pPr marL="228600" indent="-228600" eaLnBrk="1" hangingPunct="1">
+              <a:buAutoNum type="arabicPeriod"/>
+            </a:pPr>
+            <a:r>
+              <a:rPr lang="en-US" dirty="0" smtClean="0">
+                <a:latin typeface="Arial" pitchFamily="34" charset="0"/>
+                <a:ea typeface="ＭＳ Ｐゴシック" pitchFamily="34" charset="-128"/>
+              </a:rPr>
+              <a:t>Every test is isolated from every other test</a:t>
+            </a:r>
+          </a:p>
+          <a:p>
+            <a:pPr marL="228600" indent="-228600" eaLnBrk="1" hangingPunct="1">
+              <a:buAutoNum type="arabicPeriod"/>
+            </a:pPr>
+            <a:r>
+              <a:rPr lang="en-US" dirty="0" smtClean="0">
+                <a:latin typeface="Arial" pitchFamily="34" charset="0"/>
+                <a:ea typeface="ＭＳ Ｐゴシック" pitchFamily="34" charset="-128"/>
+              </a:rPr>
+              <a:t>This is expectation that one or more tests run in a specific order</a:t>
+            </a:r>
+            <a:endParaRPr lang="en-US" dirty="0" smtClean="0">
+              <a:latin typeface="Arial" pitchFamily="34" charset="0"/>
+              <a:ea typeface="ＭＳ Ｐゴシック" pitchFamily="34" charset="-128"/>
+            </a:endParaRPr>
+          </a:p>
+          <a:p>
+            <a:pPr marL="228600" indent="-228600" eaLnBrk="1" hangingPunct="1">
+              <a:buAutoNum type="arabicPeriod"/>
+            </a:pPr>
+            <a:r>
+              <a:rPr lang="en-US" dirty="0" smtClean="0">
+                <a:latin typeface="Arial" pitchFamily="34" charset="0"/>
+                <a:ea typeface="ＭＳ Ｐゴシック" pitchFamily="34" charset="-128"/>
+              </a:rPr>
+              <a:t>Once initiated, the tests can all run to completion, unattended</a:t>
+            </a:r>
+          </a:p>
+          <a:p>
+            <a:pPr marL="228600" indent="-228600" eaLnBrk="1" hangingPunct="1">
+              <a:buAutoNum type="arabicPeriod"/>
+            </a:pPr>
+            <a:r>
+              <a:rPr lang="en-US" dirty="0" smtClean="0">
+                <a:latin typeface="Arial" pitchFamily="34" charset="0"/>
+                <a:ea typeface="ＭＳ Ｐゴシック" pitchFamily="34" charset="-128"/>
+              </a:rPr>
+              <a:t>The tests result in either a pass or fail (or a defined status)</a:t>
+            </a:r>
+          </a:p>
+          <a:p>
+            <a:pPr eaLnBrk="1" hangingPunct="1"/>
+            <a:endParaRPr lang="en-US" dirty="0">
+              <a:latin typeface="Arial" pitchFamily="34" charset="0"/>
+              <a:ea typeface="ＭＳ Ｐゴシック" pitchFamily="34" charset="-128"/>
+            </a:endParaRPr>
+          </a:p>
+          <a:p>
+            <a:pPr eaLnBrk="1" hangingPunct="1"/>
+            <a:r>
+              <a:rPr lang="en-US" dirty="0" smtClean="0">
+                <a:latin typeface="Arial" pitchFamily="34" charset="0"/>
+                <a:ea typeface="ＭＳ Ｐゴシック" pitchFamily="34" charset="-128"/>
+              </a:rPr>
+              <a:t>For this presentation, we create a local database on an instance of SQL Express. This is a one-time setup that provides isolation.</a:t>
+            </a:r>
+            <a:endParaRPr lang="en-US" dirty="0" smtClean="0">
+              <a:latin typeface="Arial" pitchFamily="34" charset="0"/>
+              <a:ea typeface="ＭＳ Ｐゴシック" pitchFamily="34" charset="-128"/>
+            </a:endParaRPr>
+          </a:p>
         </p:txBody>
       </p:sp>
     </p:spTree>
+  </p:cSld>
+  <p:clrMapOvr>
+    <a:masterClrMapping/>
+  </p:clrMapOvr>
+</p:notes>
+</file>
+
+<file path=ppt/notesSlides/notesSlide10.xml><?xml version="1.0" encoding="utf-8"?>
+<p:notes xmlns:a="http://schemas.openxmlformats.org/drawingml/2006/main" xmlns:r="http://schemas.openxmlformats.org/officeDocument/2006/relationships" xmlns:p="http://schemas.openxmlformats.org/presentationml/2006/main">
+  <p:cSld>
+    <p:spTree>
+      <p:nvGrpSpPr>
+        <p:cNvPr id="1" name=""/>
+        <p:cNvGrpSpPr/>
+        <p:nvPr/>
+      </p:nvGrpSpPr>
+      <p:grpSpPr>
+        <a:xfrm>
+          <a:off x="0" y="0"/>
+          <a:ext cx="0" cy="0"/>
+          <a:chOff x="0" y="0"/>
+          <a:chExt cx="0" cy="0"/>
+        </a:xfrm>
+      </p:grpSpPr>
+      <p:sp>
+        <p:nvSpPr>
+          <p:cNvPr id="2" name="Slide Image Placeholder 1"/>
+          <p:cNvSpPr>
+            <a:spLocks noGrp="1" noRot="1" noChangeAspect="1"/>
+          </p:cNvSpPr>
+          <p:nvPr>
+            <p:ph type="sldImg"/>
+          </p:nvPr>
+        </p:nvSpPr>
+        <p:spPr/>
+      </p:sp>
+      <p:sp>
+        <p:nvSpPr>
+          <p:cNvPr id="3" name="Notes Placeholder 2"/>
+          <p:cNvSpPr>
+            <a:spLocks noGrp="1"/>
+          </p:cNvSpPr>
+          <p:nvPr>
+            <p:ph type="body" idx="1"/>
+          </p:nvPr>
+        </p:nvSpPr>
+        <p:spPr/>
+        <p:txBody>
+          <a:bodyPr/>
+          <a:lstStyle/>
+          <a:p>
+            <a:endParaRPr lang="en-US"/>
+          </a:p>
+        </p:txBody>
+      </p:sp>
+      <p:sp>
+        <p:nvSpPr>
+          <p:cNvPr id="4" name="Slide Number Placeholder 3"/>
+          <p:cNvSpPr>
+            <a:spLocks noGrp="1"/>
+          </p:cNvSpPr>
+          <p:nvPr>
+            <p:ph type="sldNum" sz="quarter" idx="10"/>
+          </p:nvPr>
+        </p:nvSpPr>
+        <p:spPr/>
+        <p:txBody>
+          <a:bodyPr/>
+          <a:lstStyle/>
+          <a:p>
+            <a:pPr>
+              <a:defRPr/>
+            </a:pPr>
+            <a:fld id="{6122490E-C14D-4509-A7F9-FC7223F2C851}" type="slidenum">
+              <a:rPr lang="en-US" smtClean="0"/>
+              <a:pPr>
+                <a:defRPr/>
+              </a:pPr>
+              <a:t>10</a:t>
+            </a:fld>
+            <a:endParaRPr lang="en-US" dirty="0"/>
+          </a:p>
+        </p:txBody>
+      </p:sp>
+    </p:spTree>
+    <p:extLst>
+      <p:ext uri="{BB962C8B-B14F-4D97-AF65-F5344CB8AC3E}">
+        <p14:creationId xmlns:p14="http://schemas.microsoft.com/office/powerpoint/2010/main" val="2658622444"/>
+      </p:ext>
+    </p:extLst>
+  </p:cSld>
+  <p:clrMapOvr>
+    <a:masterClrMapping/>
+  </p:clrMapOvr>
+</p:notes>
+</file>
+
+<file path=ppt/notesSlides/notesSlide11.xml><?xml version="1.0" encoding="utf-8"?>
+<p:notes xmlns:a="http://schemas.openxmlformats.org/drawingml/2006/main" xmlns:r="http://schemas.openxmlformats.org/officeDocument/2006/relationships" xmlns:p="http://schemas.openxmlformats.org/presentationml/2006/main">
+  <p:cSld>
+    <p:spTree>
+      <p:nvGrpSpPr>
+        <p:cNvPr id="1" name=""/>
+        <p:cNvGrpSpPr/>
+        <p:nvPr/>
+      </p:nvGrpSpPr>
+      <p:grpSpPr>
+        <a:xfrm>
+          <a:off x="0" y="0"/>
+          <a:ext cx="0" cy="0"/>
+          <a:chOff x="0" y="0"/>
+          <a:chExt cx="0" cy="0"/>
+        </a:xfrm>
+      </p:grpSpPr>
+      <p:sp>
+        <p:nvSpPr>
+          <p:cNvPr id="2" name="Slide Image Placeholder 1"/>
+          <p:cNvSpPr>
+            <a:spLocks noGrp="1" noRot="1" noChangeAspect="1"/>
+          </p:cNvSpPr>
+          <p:nvPr>
+            <p:ph type="sldImg"/>
+          </p:nvPr>
+        </p:nvSpPr>
+        <p:spPr/>
+      </p:sp>
+      <p:sp>
+        <p:nvSpPr>
+          <p:cNvPr id="3" name="Notes Placeholder 2"/>
+          <p:cNvSpPr>
+            <a:spLocks noGrp="1"/>
+          </p:cNvSpPr>
+          <p:nvPr>
+            <p:ph type="body" idx="1"/>
+          </p:nvPr>
+        </p:nvSpPr>
+        <p:spPr/>
+        <p:txBody>
+          <a:bodyPr/>
+          <a:lstStyle/>
+          <a:p>
+            <a:endParaRPr lang="en-US"/>
+          </a:p>
+        </p:txBody>
+      </p:sp>
+      <p:sp>
+        <p:nvSpPr>
+          <p:cNvPr id="4" name="Slide Number Placeholder 3"/>
+          <p:cNvSpPr>
+            <a:spLocks noGrp="1"/>
+          </p:cNvSpPr>
+          <p:nvPr>
+            <p:ph type="sldNum" sz="quarter" idx="10"/>
+          </p:nvPr>
+        </p:nvSpPr>
+        <p:spPr/>
+        <p:txBody>
+          <a:bodyPr/>
+          <a:lstStyle/>
+          <a:p>
+            <a:pPr>
+              <a:defRPr/>
+            </a:pPr>
+            <a:fld id="{6122490E-C14D-4509-A7F9-FC7223F2C851}" type="slidenum">
+              <a:rPr lang="en-US" smtClean="0"/>
+              <a:pPr>
+                <a:defRPr/>
+              </a:pPr>
+              <a:t>11</a:t>
+            </a:fld>
+            <a:endParaRPr lang="en-US" dirty="0"/>
+          </a:p>
+        </p:txBody>
+      </p:sp>
+    </p:spTree>
+    <p:extLst>
+      <p:ext uri="{BB962C8B-B14F-4D97-AF65-F5344CB8AC3E}">
+        <p14:creationId xmlns:p14="http://schemas.microsoft.com/office/powerpoint/2010/main" val="2084968692"/>
+      </p:ext>
+    </p:extLst>
+  </p:cSld>
+  <p:clrMapOvr>
+    <a:masterClrMapping/>
+  </p:clrMapOvr>
+</p:notes>
+</file>
+
+<file path=ppt/notesSlides/notesSlide12.xml><?xml version="1.0" encoding="utf-8"?>
+<p:notes xmlns:a="http://schemas.openxmlformats.org/drawingml/2006/main" xmlns:r="http://schemas.openxmlformats.org/officeDocument/2006/relationships" xmlns:p="http://schemas.openxmlformats.org/presentationml/2006/main">
+  <p:cSld>
+    <p:spTree>
+      <p:nvGrpSpPr>
+        <p:cNvPr id="1" name=""/>
+        <p:cNvGrpSpPr/>
+        <p:nvPr/>
+      </p:nvGrpSpPr>
+      <p:grpSpPr>
+        <a:xfrm>
+          <a:off x="0" y="0"/>
+          <a:ext cx="0" cy="0"/>
+          <a:chOff x="0" y="0"/>
+          <a:chExt cx="0" cy="0"/>
+        </a:xfrm>
+      </p:grpSpPr>
+      <p:sp>
+        <p:nvSpPr>
+          <p:cNvPr id="2" name="Slide Image Placeholder 1"/>
+          <p:cNvSpPr>
+            <a:spLocks noGrp="1" noRot="1" noChangeAspect="1"/>
+          </p:cNvSpPr>
+          <p:nvPr>
+            <p:ph type="sldImg"/>
+          </p:nvPr>
+        </p:nvSpPr>
+        <p:spPr/>
+      </p:sp>
+      <p:sp>
+        <p:nvSpPr>
+          <p:cNvPr id="3" name="Notes Placeholder 2"/>
+          <p:cNvSpPr>
+            <a:spLocks noGrp="1"/>
+          </p:cNvSpPr>
+          <p:nvPr>
+            <p:ph type="body" idx="1"/>
+          </p:nvPr>
+        </p:nvSpPr>
+        <p:spPr/>
+        <p:txBody>
+          <a:bodyPr/>
+          <a:lstStyle/>
+          <a:p>
+            <a:endParaRPr lang="en-US"/>
+          </a:p>
+        </p:txBody>
+      </p:sp>
+      <p:sp>
+        <p:nvSpPr>
+          <p:cNvPr id="4" name="Slide Number Placeholder 3"/>
+          <p:cNvSpPr>
+            <a:spLocks noGrp="1"/>
+          </p:cNvSpPr>
+          <p:nvPr>
+            <p:ph type="sldNum" sz="quarter" idx="10"/>
+          </p:nvPr>
+        </p:nvSpPr>
+        <p:spPr/>
+        <p:txBody>
+          <a:bodyPr/>
+          <a:lstStyle/>
+          <a:p>
+            <a:pPr>
+              <a:defRPr/>
+            </a:pPr>
+            <a:fld id="{6122490E-C14D-4509-A7F9-FC7223F2C851}" type="slidenum">
+              <a:rPr lang="en-US" smtClean="0"/>
+              <a:pPr>
+                <a:defRPr/>
+              </a:pPr>
+              <a:t>12</a:t>
+            </a:fld>
+            <a:endParaRPr lang="en-US" dirty="0"/>
+          </a:p>
+        </p:txBody>
+      </p:sp>
+    </p:spTree>
+    <p:extLst>
+      <p:ext uri="{BB962C8B-B14F-4D97-AF65-F5344CB8AC3E}">
+        <p14:creationId xmlns:p14="http://schemas.microsoft.com/office/powerpoint/2010/main" val="558085589"/>
+      </p:ext>
+    </p:extLst>
+  </p:cSld>
+  <p:clrMapOvr>
+    <a:masterClrMapping/>
+  </p:clrMapOvr>
+</p:notes>
+</file>
+
+<file path=ppt/notesSlides/notesSlide13.xml><?xml version="1.0" encoding="utf-8"?>
+<p:notes xmlns:a="http://schemas.openxmlformats.org/drawingml/2006/main" xmlns:r="http://schemas.openxmlformats.org/officeDocument/2006/relationships" xmlns:p="http://schemas.openxmlformats.org/presentationml/2006/main">
+  <p:cSld>
+    <p:spTree>
+      <p:nvGrpSpPr>
+        <p:cNvPr id="1" name=""/>
+        <p:cNvGrpSpPr/>
+        <p:nvPr/>
+      </p:nvGrpSpPr>
+      <p:grpSpPr>
+        <a:xfrm>
+          <a:off x="0" y="0"/>
+          <a:ext cx="0" cy="0"/>
+          <a:chOff x="0" y="0"/>
+          <a:chExt cx="0" cy="0"/>
+        </a:xfrm>
+      </p:grpSpPr>
+      <p:sp>
+        <p:nvSpPr>
+          <p:cNvPr id="2" name="Slide Image Placeholder 1"/>
+          <p:cNvSpPr>
+            <a:spLocks noGrp="1" noRot="1" noChangeAspect="1"/>
+          </p:cNvSpPr>
+          <p:nvPr>
+            <p:ph type="sldImg"/>
+          </p:nvPr>
+        </p:nvSpPr>
+        <p:spPr/>
+      </p:sp>
+      <p:sp>
+        <p:nvSpPr>
+          <p:cNvPr id="3" name="Notes Placeholder 2"/>
+          <p:cNvSpPr>
+            <a:spLocks noGrp="1"/>
+          </p:cNvSpPr>
+          <p:nvPr>
+            <p:ph type="body" idx="1"/>
+          </p:nvPr>
+        </p:nvSpPr>
+        <p:spPr/>
+        <p:txBody>
+          <a:bodyPr/>
+          <a:lstStyle/>
+          <a:p>
+            <a:endParaRPr lang="en-US"/>
+          </a:p>
+        </p:txBody>
+      </p:sp>
+      <p:sp>
+        <p:nvSpPr>
+          <p:cNvPr id="4" name="Slide Number Placeholder 3"/>
+          <p:cNvSpPr>
+            <a:spLocks noGrp="1"/>
+          </p:cNvSpPr>
+          <p:nvPr>
+            <p:ph type="sldNum" sz="quarter" idx="10"/>
+          </p:nvPr>
+        </p:nvSpPr>
+        <p:spPr/>
+        <p:txBody>
+          <a:bodyPr/>
+          <a:lstStyle/>
+          <a:p>
+            <a:pPr>
+              <a:defRPr/>
+            </a:pPr>
+            <a:fld id="{6122490E-C14D-4509-A7F9-FC7223F2C851}" type="slidenum">
+              <a:rPr lang="en-US" smtClean="0"/>
+              <a:pPr>
+                <a:defRPr/>
+              </a:pPr>
+              <a:t>13</a:t>
+            </a:fld>
+            <a:endParaRPr lang="en-US" dirty="0"/>
+          </a:p>
+        </p:txBody>
+      </p:sp>
+    </p:spTree>
+    <p:extLst>
+      <p:ext uri="{BB962C8B-B14F-4D97-AF65-F5344CB8AC3E}">
+        <p14:creationId xmlns:p14="http://schemas.microsoft.com/office/powerpoint/2010/main" val="3672778389"/>
+      </p:ext>
+    </p:extLst>
+  </p:cSld>
+  <p:clrMapOvr>
+    <a:masterClrMapping/>
+  </p:clrMapOvr>
+</p:notes>
+</file>
+
+<file path=ppt/notesSlides/notesSlide14.xml><?xml version="1.0" encoding="utf-8"?>
+<p:notes xmlns:a="http://schemas.openxmlformats.org/drawingml/2006/main" xmlns:r="http://schemas.openxmlformats.org/officeDocument/2006/relationships" xmlns:p="http://schemas.openxmlformats.org/presentationml/2006/main">
+  <p:cSld>
+    <p:spTree>
+      <p:nvGrpSpPr>
+        <p:cNvPr id="1" name=""/>
+        <p:cNvGrpSpPr/>
+        <p:nvPr/>
+      </p:nvGrpSpPr>
+      <p:grpSpPr>
+        <a:xfrm>
+          <a:off x="0" y="0"/>
+          <a:ext cx="0" cy="0"/>
+          <a:chOff x="0" y="0"/>
+          <a:chExt cx="0" cy="0"/>
+        </a:xfrm>
+      </p:grpSpPr>
+      <p:sp>
+        <p:nvSpPr>
+          <p:cNvPr id="2" name="Slide Image Placeholder 1"/>
+          <p:cNvSpPr>
+            <a:spLocks noGrp="1" noRot="1" noChangeAspect="1"/>
+          </p:cNvSpPr>
+          <p:nvPr>
+            <p:ph type="sldImg"/>
+          </p:nvPr>
+        </p:nvSpPr>
+        <p:spPr/>
+      </p:sp>
+      <p:sp>
+        <p:nvSpPr>
+          <p:cNvPr id="3" name="Notes Placeholder 2"/>
+          <p:cNvSpPr>
+            <a:spLocks noGrp="1"/>
+          </p:cNvSpPr>
+          <p:nvPr>
+            <p:ph type="body" idx="1"/>
+          </p:nvPr>
+        </p:nvSpPr>
+        <p:spPr/>
+        <p:txBody>
+          <a:bodyPr/>
+          <a:lstStyle/>
+          <a:p>
+            <a:endParaRPr lang="en-US"/>
+          </a:p>
+        </p:txBody>
+      </p:sp>
+      <p:sp>
+        <p:nvSpPr>
+          <p:cNvPr id="4" name="Slide Number Placeholder 3"/>
+          <p:cNvSpPr>
+            <a:spLocks noGrp="1"/>
+          </p:cNvSpPr>
+          <p:nvPr>
+            <p:ph type="sldNum" sz="quarter" idx="10"/>
+          </p:nvPr>
+        </p:nvSpPr>
+        <p:spPr/>
+        <p:txBody>
+          <a:bodyPr/>
+          <a:lstStyle/>
+          <a:p>
+            <a:pPr>
+              <a:defRPr/>
+            </a:pPr>
+            <a:fld id="{6122490E-C14D-4509-A7F9-FC7223F2C851}" type="slidenum">
+              <a:rPr lang="en-US" smtClean="0"/>
+              <a:pPr>
+                <a:defRPr/>
+              </a:pPr>
+              <a:t>14</a:t>
+            </a:fld>
+            <a:endParaRPr lang="en-US" dirty="0"/>
+          </a:p>
+        </p:txBody>
+      </p:sp>
+    </p:spTree>
+    <p:extLst>
+      <p:ext uri="{BB962C8B-B14F-4D97-AF65-F5344CB8AC3E}">
+        <p14:creationId xmlns:p14="http://schemas.microsoft.com/office/powerpoint/2010/main" val="1888057008"/>
+      </p:ext>
+    </p:extLst>
+  </p:cSld>
+  <p:clrMapOvr>
+    <a:masterClrMapping/>
+  </p:clrMapOvr>
+</p:notes>
+</file>
+
+<file path=ppt/notesSlides/notesSlide15.xml><?xml version="1.0" encoding="utf-8"?>
+<p:notes xmlns:a="http://schemas.openxmlformats.org/drawingml/2006/main" xmlns:r="http://schemas.openxmlformats.org/officeDocument/2006/relationships" xmlns:p="http://schemas.openxmlformats.org/presentationml/2006/main">
+  <p:cSld>
+    <p:spTree>
+      <p:nvGrpSpPr>
+        <p:cNvPr id="1" name=""/>
+        <p:cNvGrpSpPr/>
+        <p:nvPr/>
+      </p:nvGrpSpPr>
+      <p:grpSpPr>
+        <a:xfrm>
+          <a:off x="0" y="0"/>
+          <a:ext cx="0" cy="0"/>
+          <a:chOff x="0" y="0"/>
+          <a:chExt cx="0" cy="0"/>
+        </a:xfrm>
+      </p:grpSpPr>
+      <p:sp>
+        <p:nvSpPr>
+          <p:cNvPr id="2" name="Slide Image Placeholder 1"/>
+          <p:cNvSpPr>
+            <a:spLocks noGrp="1" noRot="1" noChangeAspect="1"/>
+          </p:cNvSpPr>
+          <p:nvPr>
+            <p:ph type="sldImg"/>
+          </p:nvPr>
+        </p:nvSpPr>
+        <p:spPr/>
+      </p:sp>
+      <p:sp>
+        <p:nvSpPr>
+          <p:cNvPr id="3" name="Notes Placeholder 2"/>
+          <p:cNvSpPr>
+            <a:spLocks noGrp="1"/>
+          </p:cNvSpPr>
+          <p:nvPr>
+            <p:ph type="body" idx="1"/>
+          </p:nvPr>
+        </p:nvSpPr>
+        <p:spPr/>
+        <p:txBody>
+          <a:bodyPr/>
+          <a:lstStyle/>
+          <a:p>
+            <a:endParaRPr lang="en-US"/>
+          </a:p>
+        </p:txBody>
+      </p:sp>
+      <p:sp>
+        <p:nvSpPr>
+          <p:cNvPr id="4" name="Slide Number Placeholder 3"/>
+          <p:cNvSpPr>
+            <a:spLocks noGrp="1"/>
+          </p:cNvSpPr>
+          <p:nvPr>
+            <p:ph type="sldNum" sz="quarter" idx="10"/>
+          </p:nvPr>
+        </p:nvSpPr>
+        <p:spPr/>
+        <p:txBody>
+          <a:bodyPr/>
+          <a:lstStyle/>
+          <a:p>
+            <a:pPr>
+              <a:defRPr/>
+            </a:pPr>
+            <a:fld id="{6122490E-C14D-4509-A7F9-FC7223F2C851}" type="slidenum">
+              <a:rPr lang="en-US" smtClean="0"/>
+              <a:pPr>
+                <a:defRPr/>
+              </a:pPr>
+              <a:t>15</a:t>
+            </a:fld>
+            <a:endParaRPr lang="en-US" dirty="0"/>
+          </a:p>
+        </p:txBody>
+      </p:sp>
+    </p:spTree>
+    <p:extLst>
+      <p:ext uri="{BB962C8B-B14F-4D97-AF65-F5344CB8AC3E}">
+        <p14:creationId xmlns:p14="http://schemas.microsoft.com/office/powerpoint/2010/main" val="26073920"/>
+      </p:ext>
+    </p:extLst>
+  </p:cSld>
+  <p:clrMapOvr>
+    <a:masterClrMapping/>
+  </p:clrMapOvr>
+</p:notes>
+</file>
+
+<file path=ppt/notesSlides/notesSlide16.xml><?xml version="1.0" encoding="utf-8"?>
+<p:notes xmlns:a="http://schemas.openxmlformats.org/drawingml/2006/main" xmlns:r="http://schemas.openxmlformats.org/officeDocument/2006/relationships" xmlns:p="http://schemas.openxmlformats.org/presentationml/2006/main">
+  <p:cSld>
+    <p:spTree>
+      <p:nvGrpSpPr>
+        <p:cNvPr id="1" name=""/>
+        <p:cNvGrpSpPr/>
+        <p:nvPr/>
+      </p:nvGrpSpPr>
+      <p:grpSpPr>
+        <a:xfrm>
+          <a:off x="0" y="0"/>
+          <a:ext cx="0" cy="0"/>
+          <a:chOff x="0" y="0"/>
+          <a:chExt cx="0" cy="0"/>
+        </a:xfrm>
+      </p:grpSpPr>
+      <p:sp>
+        <p:nvSpPr>
+          <p:cNvPr id="2" name="Slide Image Placeholder 1"/>
+          <p:cNvSpPr>
+            <a:spLocks noGrp="1" noRot="1" noChangeAspect="1"/>
+          </p:cNvSpPr>
+          <p:nvPr>
+            <p:ph type="sldImg"/>
+          </p:nvPr>
+        </p:nvSpPr>
+        <p:spPr/>
+      </p:sp>
+      <p:sp>
+        <p:nvSpPr>
+          <p:cNvPr id="3" name="Notes Placeholder 2"/>
+          <p:cNvSpPr>
+            <a:spLocks noGrp="1"/>
+          </p:cNvSpPr>
+          <p:nvPr>
+            <p:ph type="body" idx="1"/>
+          </p:nvPr>
+        </p:nvSpPr>
+        <p:spPr/>
+        <p:txBody>
+          <a:bodyPr/>
+          <a:lstStyle/>
+          <a:p>
+            <a:endParaRPr lang="en-US"/>
+          </a:p>
+        </p:txBody>
+      </p:sp>
+      <p:sp>
+        <p:nvSpPr>
+          <p:cNvPr id="4" name="Slide Number Placeholder 3"/>
+          <p:cNvSpPr>
+            <a:spLocks noGrp="1"/>
+          </p:cNvSpPr>
+          <p:nvPr>
+            <p:ph type="sldNum" sz="quarter" idx="10"/>
+          </p:nvPr>
+        </p:nvSpPr>
+        <p:spPr/>
+        <p:txBody>
+          <a:bodyPr/>
+          <a:lstStyle/>
+          <a:p>
+            <a:pPr>
+              <a:defRPr/>
+            </a:pPr>
+            <a:fld id="{6122490E-C14D-4509-A7F9-FC7223F2C851}" type="slidenum">
+              <a:rPr lang="en-US" smtClean="0"/>
+              <a:pPr>
+                <a:defRPr/>
+              </a:pPr>
+              <a:t>16</a:t>
+            </a:fld>
+            <a:endParaRPr lang="en-US" dirty="0"/>
+          </a:p>
+        </p:txBody>
+      </p:sp>
+    </p:spTree>
+    <p:extLst>
+      <p:ext uri="{BB962C8B-B14F-4D97-AF65-F5344CB8AC3E}">
+        <p14:creationId xmlns:p14="http://schemas.microsoft.com/office/powerpoint/2010/main" val="4174382200"/>
+      </p:ext>
+    </p:extLst>
   </p:cSld>
   <p:clrMapOvr>
     <a:masterClrMapping/>
@@ -937,195 +1672,47 @@
           <a:bodyPr/>
           <a:lstStyle/>
           <a:p>
-            <a:pPr marL="514350" indent="-514350">
-              <a:buFont typeface="+mj-lt"/>
-              <a:buAutoNum type="arabicPeriod"/>
-            </a:pPr>
-            <a:r>
-              <a:rPr lang="en-US" dirty="0" smtClean="0"/>
-              <a:t>Can we hold TOP SECRET clearances?</a:t>
-            </a:r>
-          </a:p>
-          <a:p>
-            <a:pPr marL="971550" lvl="1" indent="-514350">
-              <a:buFont typeface="+mj-lt"/>
-              <a:buAutoNum type="arabicPeriod"/>
-            </a:pPr>
-            <a:r>
-              <a:rPr lang="en-US" dirty="0" smtClean="0"/>
-              <a:t>No</a:t>
-            </a:r>
-          </a:p>
-          <a:p>
-            <a:pPr marL="514350" indent="-514350">
-              <a:buFont typeface="+mj-lt"/>
-              <a:buAutoNum type="arabicPeriod"/>
-            </a:pPr>
-            <a:r>
-              <a:rPr lang="en-US" dirty="0" smtClean="0"/>
-              <a:t>Where can we do SECRET work?</a:t>
-            </a:r>
-          </a:p>
-          <a:p>
-            <a:pPr marL="971550" lvl="1" indent="-514350"/>
-            <a:r>
-              <a:rPr lang="en-US" dirty="0" smtClean="0"/>
-              <a:t>Clearance is through DoD, but it's accepted everywhere*</a:t>
-            </a:r>
-          </a:p>
-          <a:p>
-            <a:pPr marL="514350" indent="-514350">
-              <a:buFont typeface="+mj-lt"/>
-              <a:buAutoNum type="arabicPeriod"/>
-            </a:pPr>
-            <a:r>
-              <a:rPr lang="en-US" dirty="0" smtClean="0"/>
-              <a:t>When can I get a clearance?</a:t>
-            </a:r>
-          </a:p>
-          <a:p>
-            <a:pPr marL="971550" lvl="1" indent="-514350"/>
-            <a:r>
-              <a:rPr lang="en-US" dirty="0" smtClean="0"/>
-              <a:t>As needed</a:t>
-            </a:r>
-          </a:p>
-          <a:p>
-            <a:pPr marL="514350" indent="-514350">
-              <a:buFont typeface="+mj-lt"/>
-              <a:buAutoNum type="arabicPeriod"/>
-            </a:pPr>
-            <a:r>
-              <a:rPr lang="en-US" dirty="0" smtClean="0"/>
-              <a:t>How long will my clearance last?</a:t>
-            </a:r>
-          </a:p>
-          <a:p>
-            <a:pPr marL="971550" lvl="1" indent="-514350"/>
-            <a:r>
-              <a:rPr lang="en-US" dirty="0" smtClean="0"/>
-              <a:t>Until no longer needed</a:t>
-            </a:r>
-          </a:p>
-          <a:p>
-            <a:pPr marL="514350" indent="-514350">
-              <a:buFont typeface="+mj-lt"/>
-              <a:buAutoNum type="arabicPeriod"/>
-            </a:pPr>
-            <a:r>
-              <a:rPr lang="en-US" dirty="0" smtClean="0"/>
-              <a:t>How does this help BD?</a:t>
-            </a:r>
-          </a:p>
-          <a:p>
-            <a:pPr marL="971550" lvl="1" indent="-514350"/>
-            <a:r>
-              <a:rPr lang="en-US" dirty="0" smtClean="0"/>
-              <a:t>We can pursue opportunities that weren’t previously feasible</a:t>
-            </a:r>
-          </a:p>
-          <a:p>
-            <a:pPr marL="514350" indent="-514350">
-              <a:buFont typeface="+mj-lt"/>
-              <a:buAutoNum type="arabicPeriod"/>
-            </a:pPr>
-            <a:r>
-              <a:rPr lang="en-US" dirty="0" smtClean="0"/>
-              <a:t>How does this help recruiting?</a:t>
-            </a:r>
-          </a:p>
-          <a:p>
-            <a:pPr marL="971550" lvl="1" indent="-514350">
-              <a:buFont typeface="+mj-lt"/>
-              <a:buAutoNum type="arabicPeriod"/>
-            </a:pPr>
-            <a:r>
-              <a:rPr lang="en-US" dirty="0" smtClean="0"/>
-              <a:t>We can transfer a new hire’s SECRET clearance </a:t>
-            </a:r>
-            <a:r>
-              <a:rPr lang="en-US" b="1" dirty="0" smtClean="0"/>
-              <a:t>if</a:t>
-            </a:r>
-            <a:r>
-              <a:rPr lang="en-US" dirty="0" smtClean="0"/>
-              <a:t> they are going directly onto a project that requires the clearance</a:t>
-            </a:r>
-          </a:p>
-          <a:p>
-            <a:pPr marL="971550" lvl="1" indent="-514350">
-              <a:buFont typeface="+mj-lt"/>
-              <a:buAutoNum type="arabicPeriod"/>
-            </a:pPr>
-            <a:r>
-              <a:rPr lang="en-US" dirty="0" smtClean="0"/>
-              <a:t>If we don’t have work, the new hire can still reinstate their clearance if they start doing SECRET work within 2 years</a:t>
-            </a:r>
-          </a:p>
-          <a:p>
-            <a:pPr marL="0" indent="0">
-              <a:buNone/>
-            </a:pPr>
-            <a:endParaRPr lang="en-US" dirty="0" smtClean="0"/>
-          </a:p>
-          <a:p>
-            <a:pPr marL="0" marR="0" indent="0" algn="l" defTabSz="457200" rtl="0" eaLnBrk="1" fontAlgn="auto" latinLnBrk="0" hangingPunct="1">
-              <a:lnSpc>
-                <a:spcPct val="100000"/>
-              </a:lnSpc>
-              <a:spcBef>
-                <a:spcPts val="0"/>
-              </a:spcBef>
-              <a:spcAft>
-                <a:spcPts val="0"/>
-              </a:spcAft>
-              <a:buClrTx/>
-              <a:buSzTx/>
-              <a:buFontTx/>
-              <a:buNone/>
-              <a:tabLst/>
+            <a:r>
+              <a:rPr lang="en-US" dirty="0" smtClean="0"/>
+              <a:t>Introductory remarks.</a:t>
+            </a:r>
+            <a:endParaRPr lang="en-US" dirty="0"/>
+          </a:p>
+        </p:txBody>
+      </p:sp>
+      <p:sp>
+        <p:nvSpPr>
+          <p:cNvPr id="4" name="Slide Number Placeholder 3"/>
+          <p:cNvSpPr>
+            <a:spLocks noGrp="1"/>
+          </p:cNvSpPr>
+          <p:nvPr>
+            <p:ph type="sldNum" sz="quarter" idx="10"/>
+          </p:nvPr>
+        </p:nvSpPr>
+        <p:spPr/>
+        <p:txBody>
+          <a:bodyPr/>
+          <a:lstStyle/>
+          <a:p>
+            <a:pPr>
               <a:defRPr/>
             </a:pPr>
+            <a:fld id="{6122490E-C14D-4509-A7F9-FC7223F2C851}" type="slidenum">
+              <a:rPr lang="en-US" smtClean="0"/>
+              <a:pPr>
+                <a:defRPr/>
+              </a:pPr>
+              <a:t>2</a:t>
+            </a:fld>
             <a:endParaRPr lang="en-US" dirty="0"/>
-          </a:p>
-        </p:txBody>
-      </p:sp>
-      <p:sp>
-        <p:nvSpPr>
-          <p:cNvPr id="4" name="Slide Number Placeholder 3"/>
-          <p:cNvSpPr>
-            <a:spLocks noGrp="1"/>
-          </p:cNvSpPr>
-          <p:nvPr>
-            <p:ph type="sldNum" sz="quarter" idx="10"/>
-          </p:nvPr>
-        </p:nvSpPr>
-        <p:spPr/>
-        <p:txBody>
-          <a:bodyPr/>
-          <a:lstStyle/>
-          <a:p>
-            <a:fld id="{A9BD41C3-251C-A347-8A21-AED582F5726E}" type="slidenum">
-              <a:rPr lang="en-US" smtClean="0">
-                <a:solidFill>
-                  <a:prstClr val="black"/>
-                </a:solidFill>
-              </a:rPr>
-              <a:pPr/>
-              <a:t>3</a:t>
-            </a:fld>
-            <a:endParaRPr lang="en-US">
-              <a:solidFill>
-                <a:prstClr val="black"/>
-              </a:solidFill>
-            </a:endParaRPr>
           </a:p>
         </p:txBody>
       </p:sp>
     </p:spTree>
     <p:extLst>
       <p:ext uri="{BB962C8B-B14F-4D97-AF65-F5344CB8AC3E}">
-        <p14:creationId xmlns:p14="http://schemas.microsoft.com/office/powerpoint/2010/main" val="1379355316"/>
+        <p14:creationId xmlns:p14="http://schemas.microsoft.com/office/powerpoint/2010/main" val="845115298"/>
       </p:ext>
     </p:extLst>
   </p:cSld>
@@ -1179,136 +1766,27 @@
           <a:bodyPr/>
           <a:lstStyle/>
           <a:p>
-            <a:pPr marL="514350" indent="-514350">
-              <a:buFont typeface="+mj-lt"/>
-              <a:buAutoNum type="arabicPeriod"/>
+            <a:pPr marL="0" marR="0" indent="0" algn="l" defTabSz="457200" rtl="0" eaLnBrk="1" fontAlgn="auto" latinLnBrk="0" hangingPunct="1">
+              <a:lnSpc>
+                <a:spcPct val="100000"/>
+              </a:lnSpc>
+              <a:spcBef>
+                <a:spcPts val="0"/>
+              </a:spcBef>
+              <a:spcAft>
+                <a:spcPts val="0"/>
+              </a:spcAft>
+              <a:buClrTx/>
+              <a:buSzTx/>
+              <a:buFontTx/>
+              <a:buNone/>
+              <a:tabLst/>
+              <a:defRPr/>
             </a:pPr>
             <a:r>
               <a:rPr lang="en-US" dirty="0" smtClean="0"/>
-              <a:t>Can we hold TOP SECRET clearances?</a:t>
-            </a:r>
-          </a:p>
-          <a:p>
-            <a:pPr marL="971550" lvl="1" indent="-514350">
-              <a:buFont typeface="+mj-lt"/>
-              <a:buAutoNum type="arabicPeriod"/>
-            </a:pPr>
-            <a:r>
-              <a:rPr lang="en-US" dirty="0" smtClean="0"/>
-              <a:t>No</a:t>
-            </a:r>
-          </a:p>
-          <a:p>
-            <a:pPr marL="514350" indent="-514350">
-              <a:buFont typeface="+mj-lt"/>
-              <a:buAutoNum type="arabicPeriod"/>
-            </a:pPr>
-            <a:r>
-              <a:rPr lang="en-US" dirty="0" smtClean="0"/>
-              <a:t>Where can we do SECRET work?</a:t>
-            </a:r>
-          </a:p>
-          <a:p>
-            <a:pPr marL="971550" lvl="1" indent="-514350"/>
-            <a:r>
-              <a:rPr lang="en-US" dirty="0" smtClean="0"/>
-              <a:t>Clearance is through DoD, but it's accepted everywhere*</a:t>
-            </a:r>
-          </a:p>
-          <a:p>
-            <a:pPr marL="514350" indent="-514350">
-              <a:buFont typeface="+mj-lt"/>
-              <a:buAutoNum type="arabicPeriod"/>
-            </a:pPr>
-            <a:r>
-              <a:rPr lang="en-US" dirty="0" smtClean="0"/>
-              <a:t>When can I get a clearance?</a:t>
-            </a:r>
-          </a:p>
-          <a:p>
-            <a:pPr marL="971550" lvl="1" indent="-514350"/>
-            <a:r>
-              <a:rPr lang="en-US" dirty="0" smtClean="0"/>
-              <a:t>As needed</a:t>
-            </a:r>
-          </a:p>
-          <a:p>
-            <a:pPr marL="514350" indent="-514350">
-              <a:buFont typeface="+mj-lt"/>
-              <a:buAutoNum type="arabicPeriod"/>
-            </a:pPr>
-            <a:r>
-              <a:rPr lang="en-US" dirty="0" smtClean="0"/>
-              <a:t>How long will my clearance last?</a:t>
-            </a:r>
-          </a:p>
-          <a:p>
-            <a:pPr marL="971550" lvl="1" indent="-514350"/>
-            <a:r>
-              <a:rPr lang="en-US" dirty="0" smtClean="0"/>
-              <a:t>Until no longer needed</a:t>
-            </a:r>
-          </a:p>
-          <a:p>
-            <a:pPr marL="514350" indent="-514350">
-              <a:buFont typeface="+mj-lt"/>
-              <a:buAutoNum type="arabicPeriod"/>
-            </a:pPr>
-            <a:r>
-              <a:rPr lang="en-US" dirty="0" smtClean="0"/>
-              <a:t>How does this help BD?</a:t>
-            </a:r>
-          </a:p>
-          <a:p>
-            <a:pPr marL="971550" lvl="1" indent="-514350"/>
-            <a:r>
-              <a:rPr lang="en-US" dirty="0" smtClean="0"/>
-              <a:t>We can pursue opportunities that weren’t previously feasible</a:t>
-            </a:r>
-          </a:p>
-          <a:p>
-            <a:pPr marL="514350" indent="-514350">
-              <a:buFont typeface="+mj-lt"/>
-              <a:buAutoNum type="arabicPeriod"/>
-            </a:pPr>
-            <a:r>
-              <a:rPr lang="en-US" dirty="0" smtClean="0"/>
-              <a:t>How does this help recruiting?</a:t>
-            </a:r>
-          </a:p>
-          <a:p>
-            <a:pPr marL="971550" lvl="1" indent="-514350">
-              <a:buFont typeface="+mj-lt"/>
-              <a:buAutoNum type="arabicPeriod"/>
-            </a:pPr>
-            <a:r>
-              <a:rPr lang="en-US" dirty="0" smtClean="0"/>
-              <a:t>We can transfer a new hire’s SECRET clearance </a:t>
-            </a:r>
-            <a:r>
-              <a:rPr lang="en-US" b="1" dirty="0" smtClean="0"/>
-              <a:t>if</a:t>
-            </a:r>
-            <a:r>
-              <a:rPr lang="en-US" dirty="0" smtClean="0"/>
-              <a:t> they are going directly onto a project that requires the clearance</a:t>
-            </a:r>
-          </a:p>
-          <a:p>
-            <a:pPr marL="971550" lvl="1" indent="-514350">
-              <a:buFont typeface="+mj-lt"/>
-              <a:buAutoNum type="arabicPeriod"/>
-            </a:pPr>
-            <a:r>
-              <a:rPr lang="en-US" dirty="0" smtClean="0"/>
-              <a:t>If we don’t have work, the new hire can still reinstate their clearance if they start doing SECRET work within 2 years</a:t>
-            </a:r>
-          </a:p>
-          <a:p>
-            <a:pPr marL="0" indent="0">
-              <a:buNone/>
-            </a:pPr>
-            <a:endParaRPr lang="en-US" dirty="0" smtClean="0"/>
+              <a:t>The database is a subsystem that is often treated like a “black box”.</a:t>
+            </a:r>
           </a:p>
           <a:p>
             <a:pPr marL="0" marR="0" indent="0" algn="l" defTabSz="457200" rtl="0" eaLnBrk="1" fontAlgn="auto" latinLnBrk="0" hangingPunct="1">
@@ -1330,6 +1808,159 @@
             </a:pPr>
             <a:endParaRPr lang="en-US" dirty="0"/>
           </a:p>
+          <a:p>
+            <a:pPr marL="0" marR="0" indent="0" algn="l" defTabSz="457200" rtl="0" eaLnBrk="1" fontAlgn="auto" latinLnBrk="0" hangingPunct="1">
+              <a:lnSpc>
+                <a:spcPct val="100000"/>
+              </a:lnSpc>
+              <a:spcBef>
+                <a:spcPts val="0"/>
+              </a:spcBef>
+              <a:spcAft>
+                <a:spcPts val="0"/>
+              </a:spcAft>
+              <a:buClrTx/>
+              <a:buSzTx/>
+              <a:buFontTx/>
+              <a:buNone/>
+              <a:tabLst/>
+              <a:defRPr/>
+            </a:pPr>
+            <a:r>
+              <a:rPr lang="en-US" dirty="0" smtClean="0"/>
+              <a:t>Development team often own the stored procedures, function, and triggers. They often have logic that satisfies an explicit or implicit requirement.</a:t>
+            </a:r>
+          </a:p>
+          <a:p>
+            <a:pPr marL="0" marR="0" indent="0" algn="l" defTabSz="457200" rtl="0" eaLnBrk="1" fontAlgn="auto" latinLnBrk="0" hangingPunct="1">
+              <a:lnSpc>
+                <a:spcPct val="100000"/>
+              </a:lnSpc>
+              <a:spcBef>
+                <a:spcPts val="0"/>
+              </a:spcBef>
+              <a:spcAft>
+                <a:spcPts val="0"/>
+              </a:spcAft>
+              <a:buClrTx/>
+              <a:buSzTx/>
+              <a:buFontTx/>
+              <a:buNone/>
+              <a:tabLst/>
+              <a:defRPr/>
+            </a:pPr>
+            <a:endParaRPr lang="en-US" dirty="0"/>
+          </a:p>
+          <a:p>
+            <a:pPr marL="0" marR="0" indent="0" algn="l" defTabSz="457200" rtl="0" eaLnBrk="1" fontAlgn="auto" latinLnBrk="0" hangingPunct="1">
+              <a:lnSpc>
+                <a:spcPct val="100000"/>
+              </a:lnSpc>
+              <a:spcBef>
+                <a:spcPts val="0"/>
+              </a:spcBef>
+              <a:spcAft>
+                <a:spcPts val="0"/>
+              </a:spcAft>
+              <a:buClrTx/>
+              <a:buSzTx/>
+              <a:buFontTx/>
+              <a:buNone/>
+              <a:tabLst/>
+              <a:defRPr/>
+            </a:pPr>
+            <a:r>
+              <a:rPr lang="en-US" dirty="0" smtClean="0"/>
+              <a:t>In many organizations, the DBA team owns the table schema.</a:t>
+            </a:r>
+          </a:p>
+          <a:p>
+            <a:pPr marL="0" marR="0" indent="0" algn="l" defTabSz="457200" rtl="0" eaLnBrk="1" fontAlgn="auto" latinLnBrk="0" hangingPunct="1">
+              <a:lnSpc>
+                <a:spcPct val="100000"/>
+              </a:lnSpc>
+              <a:spcBef>
+                <a:spcPts val="0"/>
+              </a:spcBef>
+              <a:spcAft>
+                <a:spcPts val="0"/>
+              </a:spcAft>
+              <a:buClrTx/>
+              <a:buSzTx/>
+              <a:buFontTx/>
+              <a:buNone/>
+              <a:tabLst/>
+              <a:defRPr/>
+            </a:pPr>
+            <a:endParaRPr lang="en-US" dirty="0"/>
+          </a:p>
+          <a:p>
+            <a:pPr marL="0" marR="0" indent="0" algn="l" defTabSz="457200" rtl="0" eaLnBrk="1" fontAlgn="auto" latinLnBrk="0" hangingPunct="1">
+              <a:lnSpc>
+                <a:spcPct val="100000"/>
+              </a:lnSpc>
+              <a:spcBef>
+                <a:spcPts val="0"/>
+              </a:spcBef>
+              <a:spcAft>
+                <a:spcPts val="0"/>
+              </a:spcAft>
+              <a:buClrTx/>
+              <a:buSzTx/>
+              <a:buFontTx/>
+              <a:buNone/>
+              <a:tabLst/>
+              <a:defRPr/>
+            </a:pPr>
+            <a:r>
+              <a:rPr lang="en-US" dirty="0" smtClean="0"/>
+              <a:t>Unit testing databases is difficult because a “unit”, such as a table, is hard to test in isolation. For example, your test code might need to use ADO.NET to query the table. Any number of configuration issues might prevent the test from passing. Besides, this is an integration test.</a:t>
+            </a:r>
+          </a:p>
+          <a:p>
+            <a:pPr marL="0" marR="0" indent="0" algn="l" defTabSz="457200" rtl="0" eaLnBrk="1" fontAlgn="auto" latinLnBrk="0" hangingPunct="1">
+              <a:lnSpc>
+                <a:spcPct val="100000"/>
+              </a:lnSpc>
+              <a:spcBef>
+                <a:spcPts val="0"/>
+              </a:spcBef>
+              <a:spcAft>
+                <a:spcPts val="0"/>
+              </a:spcAft>
+              <a:buClrTx/>
+              <a:buSzTx/>
+              <a:buFontTx/>
+              <a:buNone/>
+              <a:tabLst/>
+              <a:defRPr/>
+            </a:pPr>
+            <a:endParaRPr lang="en-US" dirty="0"/>
+          </a:p>
+          <a:p>
+            <a:pPr marL="0" marR="0" indent="0" algn="l" defTabSz="457200" rtl="0" eaLnBrk="1" fontAlgn="auto" latinLnBrk="0" hangingPunct="1">
+              <a:lnSpc>
+                <a:spcPct val="100000"/>
+              </a:lnSpc>
+              <a:spcBef>
+                <a:spcPts val="0"/>
+              </a:spcBef>
+              <a:spcAft>
+                <a:spcPts val="0"/>
+              </a:spcAft>
+              <a:buClrTx/>
+              <a:buSzTx/>
+              <a:buFontTx/>
+              <a:buNone/>
+              <a:tabLst/>
+              <a:defRPr/>
+            </a:pPr>
+            <a:r>
+              <a:rPr lang="en-US" dirty="0" smtClean="0"/>
+              <a:t>Unit testing stored procedures is difficult because it is difficult to “Arrange” that the data in the tables is mocked so that it is in a known state before the test code executes the SP.</a:t>
+            </a:r>
+            <a:endParaRPr lang="en-US" dirty="0"/>
+          </a:p>
         </p:txBody>
       </p:sp>
       <p:sp>
@@ -1354,7 +1985,7 @@
                 </a:solidFill>
               </a:rPr>
               <a:pPr/>
-              <a:t>4</a:t>
+              <a:t>3</a:t>
             </a:fld>
             <a:endParaRPr lang="en-US">
               <a:solidFill>
@@ -1421,138 +2052,6 @@
           <a:bodyPr/>
           <a:lstStyle/>
           <a:p>
-            <a:pPr marL="514350" indent="-514350">
-              <a:buFont typeface="+mj-lt"/>
-              <a:buAutoNum type="arabicPeriod"/>
-            </a:pPr>
-            <a:r>
-              <a:rPr lang="en-US" dirty="0" smtClean="0"/>
-              <a:t>Can we hold TOP SECRET clearances?</a:t>
-            </a:r>
-          </a:p>
-          <a:p>
-            <a:pPr marL="971550" lvl="1" indent="-514350">
-              <a:buFont typeface="+mj-lt"/>
-              <a:buAutoNum type="arabicPeriod"/>
-            </a:pPr>
-            <a:r>
-              <a:rPr lang="en-US" dirty="0" smtClean="0"/>
-              <a:t>No</a:t>
-            </a:r>
-          </a:p>
-          <a:p>
-            <a:pPr marL="514350" indent="-514350">
-              <a:buFont typeface="+mj-lt"/>
-              <a:buAutoNum type="arabicPeriod"/>
-            </a:pPr>
-            <a:r>
-              <a:rPr lang="en-US" dirty="0" smtClean="0"/>
-              <a:t>Where can we do SECRET work?</a:t>
-            </a:r>
-          </a:p>
-          <a:p>
-            <a:pPr marL="971550" lvl="1" indent="-514350"/>
-            <a:r>
-              <a:rPr lang="en-US" dirty="0" smtClean="0"/>
-              <a:t>Clearance is through DoD, but it's accepted everywhere*</a:t>
-            </a:r>
-          </a:p>
-          <a:p>
-            <a:pPr marL="514350" indent="-514350">
-              <a:buFont typeface="+mj-lt"/>
-              <a:buAutoNum type="arabicPeriod"/>
-            </a:pPr>
-            <a:r>
-              <a:rPr lang="en-US" dirty="0" smtClean="0"/>
-              <a:t>When can I get a clearance?</a:t>
-            </a:r>
-          </a:p>
-          <a:p>
-            <a:pPr marL="971550" lvl="1" indent="-514350"/>
-            <a:r>
-              <a:rPr lang="en-US" dirty="0" smtClean="0"/>
-              <a:t>As needed</a:t>
-            </a:r>
-          </a:p>
-          <a:p>
-            <a:pPr marL="514350" indent="-514350">
-              <a:buFont typeface="+mj-lt"/>
-              <a:buAutoNum type="arabicPeriod"/>
-            </a:pPr>
-            <a:r>
-              <a:rPr lang="en-US" dirty="0" smtClean="0"/>
-              <a:t>How long will my clearance last?</a:t>
-            </a:r>
-          </a:p>
-          <a:p>
-            <a:pPr marL="971550" lvl="1" indent="-514350"/>
-            <a:r>
-              <a:rPr lang="en-US" dirty="0" smtClean="0"/>
-              <a:t>Until no longer needed</a:t>
-            </a:r>
-          </a:p>
-          <a:p>
-            <a:pPr marL="514350" indent="-514350">
-              <a:buFont typeface="+mj-lt"/>
-              <a:buAutoNum type="arabicPeriod"/>
-            </a:pPr>
-            <a:r>
-              <a:rPr lang="en-US" dirty="0" smtClean="0"/>
-              <a:t>How does this help BD?</a:t>
-            </a:r>
-          </a:p>
-          <a:p>
-            <a:pPr marL="971550" lvl="1" indent="-514350"/>
-            <a:r>
-              <a:rPr lang="en-US" dirty="0" smtClean="0"/>
-              <a:t>We can pursue opportunities that weren’t previously feasible</a:t>
-            </a:r>
-          </a:p>
-          <a:p>
-            <a:pPr marL="514350" indent="-514350">
-              <a:buFont typeface="+mj-lt"/>
-              <a:buAutoNum type="arabicPeriod"/>
-            </a:pPr>
-            <a:r>
-              <a:rPr lang="en-US" dirty="0" smtClean="0"/>
-              <a:t>How does this help recruiting?</a:t>
-            </a:r>
-          </a:p>
-          <a:p>
-            <a:pPr marL="971550" lvl="1" indent="-514350">
-              <a:buFont typeface="+mj-lt"/>
-              <a:buAutoNum type="arabicPeriod"/>
-            </a:pPr>
-            <a:r>
-              <a:rPr lang="en-US" dirty="0" smtClean="0"/>
-              <a:t>We can transfer a new hire’s SECRET clearance </a:t>
-            </a:r>
-            <a:r>
-              <a:rPr lang="en-US" b="1" dirty="0" smtClean="0"/>
-              <a:t>if</a:t>
-            </a:r>
-            <a:r>
-              <a:rPr lang="en-US" dirty="0" smtClean="0"/>
-              <a:t> they are going directly onto a project that requires the clearance</a:t>
-            </a:r>
-          </a:p>
-          <a:p>
-            <a:pPr marL="971550" lvl="1" indent="-514350">
-              <a:buFont typeface="+mj-lt"/>
-              <a:buAutoNum type="arabicPeriod"/>
-            </a:pPr>
-            <a:r>
-              <a:rPr lang="en-US" dirty="0" smtClean="0"/>
-              <a:t>If we don’t have work, the new hire can still reinstate their clearance if they start doing SECRET work within 2 years</a:t>
-            </a:r>
-          </a:p>
-          <a:p>
-            <a:pPr marL="0" indent="0">
-              <a:buNone/>
-            </a:pPr>
-            <a:endParaRPr lang="en-US" dirty="0" smtClean="0"/>
-          </a:p>
-          <a:p>
             <a:pPr marL="0" marR="0" indent="0" algn="l" defTabSz="457200" rtl="0" eaLnBrk="1" fontAlgn="auto" latinLnBrk="0" hangingPunct="1">
               <a:lnSpc>
                 <a:spcPct val="100000"/>
@@ -1596,7 +2095,7 @@
                 </a:solidFill>
               </a:rPr>
               <a:pPr/>
-              <a:t>5</a:t>
+              <a:t>4</a:t>
             </a:fld>
             <a:endParaRPr lang="en-US">
               <a:solidFill>
@@ -1663,138 +2162,6 @@
           <a:bodyPr/>
           <a:lstStyle/>
           <a:p>
-            <a:pPr marL="514350" indent="-514350">
-              <a:buFont typeface="+mj-lt"/>
-              <a:buAutoNum type="arabicPeriod"/>
-            </a:pPr>
-            <a:r>
-              <a:rPr lang="en-US" dirty="0" smtClean="0"/>
-              <a:t>Can we hold TOP SECRET clearances?</a:t>
-            </a:r>
-          </a:p>
-          <a:p>
-            <a:pPr marL="971550" lvl="1" indent="-514350">
-              <a:buFont typeface="+mj-lt"/>
-              <a:buAutoNum type="arabicPeriod"/>
-            </a:pPr>
-            <a:r>
-              <a:rPr lang="en-US" dirty="0" smtClean="0"/>
-              <a:t>No</a:t>
-            </a:r>
-          </a:p>
-          <a:p>
-            <a:pPr marL="514350" indent="-514350">
-              <a:buFont typeface="+mj-lt"/>
-              <a:buAutoNum type="arabicPeriod"/>
-            </a:pPr>
-            <a:r>
-              <a:rPr lang="en-US" dirty="0" smtClean="0"/>
-              <a:t>Where can we do SECRET work?</a:t>
-            </a:r>
-          </a:p>
-          <a:p>
-            <a:pPr marL="971550" lvl="1" indent="-514350"/>
-            <a:r>
-              <a:rPr lang="en-US" dirty="0" smtClean="0"/>
-              <a:t>Clearance is through DoD, but it's accepted everywhere*</a:t>
-            </a:r>
-          </a:p>
-          <a:p>
-            <a:pPr marL="514350" indent="-514350">
-              <a:buFont typeface="+mj-lt"/>
-              <a:buAutoNum type="arabicPeriod"/>
-            </a:pPr>
-            <a:r>
-              <a:rPr lang="en-US" dirty="0" smtClean="0"/>
-              <a:t>When can I get a clearance?</a:t>
-            </a:r>
-          </a:p>
-          <a:p>
-            <a:pPr marL="971550" lvl="1" indent="-514350"/>
-            <a:r>
-              <a:rPr lang="en-US" dirty="0" smtClean="0"/>
-              <a:t>As needed</a:t>
-            </a:r>
-          </a:p>
-          <a:p>
-            <a:pPr marL="514350" indent="-514350">
-              <a:buFont typeface="+mj-lt"/>
-              <a:buAutoNum type="arabicPeriod"/>
-            </a:pPr>
-            <a:r>
-              <a:rPr lang="en-US" dirty="0" smtClean="0"/>
-              <a:t>How long will my clearance last?</a:t>
-            </a:r>
-          </a:p>
-          <a:p>
-            <a:pPr marL="971550" lvl="1" indent="-514350"/>
-            <a:r>
-              <a:rPr lang="en-US" dirty="0" smtClean="0"/>
-              <a:t>Until no longer needed</a:t>
-            </a:r>
-          </a:p>
-          <a:p>
-            <a:pPr marL="514350" indent="-514350">
-              <a:buFont typeface="+mj-lt"/>
-              <a:buAutoNum type="arabicPeriod"/>
-            </a:pPr>
-            <a:r>
-              <a:rPr lang="en-US" dirty="0" smtClean="0"/>
-              <a:t>How does this help BD?</a:t>
-            </a:r>
-          </a:p>
-          <a:p>
-            <a:pPr marL="971550" lvl="1" indent="-514350"/>
-            <a:r>
-              <a:rPr lang="en-US" dirty="0" smtClean="0"/>
-              <a:t>We can pursue opportunities that weren’t previously feasible</a:t>
-            </a:r>
-          </a:p>
-          <a:p>
-            <a:pPr marL="514350" indent="-514350">
-              <a:buFont typeface="+mj-lt"/>
-              <a:buAutoNum type="arabicPeriod"/>
-            </a:pPr>
-            <a:r>
-              <a:rPr lang="en-US" dirty="0" smtClean="0"/>
-              <a:t>How does this help recruiting?</a:t>
-            </a:r>
-          </a:p>
-          <a:p>
-            <a:pPr marL="971550" lvl="1" indent="-514350">
-              <a:buFont typeface="+mj-lt"/>
-              <a:buAutoNum type="arabicPeriod"/>
-            </a:pPr>
-            <a:r>
-              <a:rPr lang="en-US" dirty="0" smtClean="0"/>
-              <a:t>We can transfer a new hire’s SECRET clearance </a:t>
-            </a:r>
-            <a:r>
-              <a:rPr lang="en-US" b="1" dirty="0" smtClean="0"/>
-              <a:t>if</a:t>
-            </a:r>
-            <a:r>
-              <a:rPr lang="en-US" dirty="0" smtClean="0"/>
-              <a:t> they are going directly onto a project that requires the clearance</a:t>
-            </a:r>
-          </a:p>
-          <a:p>
-            <a:pPr marL="971550" lvl="1" indent="-514350">
-              <a:buFont typeface="+mj-lt"/>
-              <a:buAutoNum type="arabicPeriod"/>
-            </a:pPr>
-            <a:r>
-              <a:rPr lang="en-US" dirty="0" smtClean="0"/>
-              <a:t>If we don’t have work, the new hire can still reinstate their clearance if they start doing SECRET work within 2 years</a:t>
-            </a:r>
-          </a:p>
-          <a:p>
-            <a:pPr marL="0" indent="0">
-              <a:buNone/>
-            </a:pPr>
-            <a:endParaRPr lang="en-US" dirty="0" smtClean="0"/>
-          </a:p>
-          <a:p>
             <a:pPr marL="0" marR="0" indent="0" algn="l" defTabSz="457200" rtl="0" eaLnBrk="1" fontAlgn="auto" latinLnBrk="0" hangingPunct="1">
               <a:lnSpc>
                 <a:spcPct val="100000"/>
@@ -1838,6 +2205,116 @@
                 </a:solidFill>
               </a:rPr>
               <a:pPr/>
+              <a:t>5</a:t>
+            </a:fld>
+            <a:endParaRPr lang="en-US">
+              <a:solidFill>
+                <a:prstClr val="black"/>
+              </a:solidFill>
+            </a:endParaRPr>
+          </a:p>
+        </p:txBody>
+      </p:sp>
+    </p:spTree>
+    <p:extLst>
+      <p:ext uri="{BB962C8B-B14F-4D97-AF65-F5344CB8AC3E}">
+        <p14:creationId xmlns:p14="http://schemas.microsoft.com/office/powerpoint/2010/main" val="1379355316"/>
+      </p:ext>
+    </p:extLst>
+  </p:cSld>
+  <p:clrMapOvr>
+    <a:masterClrMapping/>
+  </p:clrMapOvr>
+</p:notes>
+</file>
+
+<file path=ppt/notesSlides/notesSlide6.xml><?xml version="1.0" encoding="utf-8"?>
+<p:notes xmlns:a="http://schemas.openxmlformats.org/drawingml/2006/main" xmlns:r="http://schemas.openxmlformats.org/officeDocument/2006/relationships" xmlns:p="http://schemas.openxmlformats.org/presentationml/2006/main">
+  <p:cSld>
+    <p:spTree>
+      <p:nvGrpSpPr>
+        <p:cNvPr id="1" name=""/>
+        <p:cNvGrpSpPr/>
+        <p:nvPr/>
+      </p:nvGrpSpPr>
+      <p:grpSpPr>
+        <a:xfrm>
+          <a:off x="0" y="0"/>
+          <a:ext cx="0" cy="0"/>
+          <a:chOff x="0" y="0"/>
+          <a:chExt cx="0" cy="0"/>
+        </a:xfrm>
+      </p:grpSpPr>
+      <p:sp>
+        <p:nvSpPr>
+          <p:cNvPr id="2" name="Slide Image Placeholder 1"/>
+          <p:cNvSpPr>
+            <a:spLocks noGrp="1" noRot="1" noChangeAspect="1"/>
+          </p:cNvSpPr>
+          <p:nvPr>
+            <p:ph type="sldImg"/>
+          </p:nvPr>
+        </p:nvSpPr>
+        <p:spPr/>
+      </p:sp>
+      <p:sp>
+        <p:nvSpPr>
+          <p:cNvPr id="3" name="Notes Placeholder 2"/>
+          <p:cNvSpPr>
+            <a:spLocks noGrp="1"/>
+          </p:cNvSpPr>
+          <p:nvPr>
+            <p:ph type="body" idx="1"/>
+          </p:nvPr>
+        </p:nvSpPr>
+        <p:spPr/>
+        <p:txBody>
+          <a:bodyPr/>
+          <a:lstStyle/>
+          <a:p>
+            <a:pPr marL="0" marR="0" indent="0" algn="l" defTabSz="457200" rtl="0" eaLnBrk="1" fontAlgn="auto" latinLnBrk="0" hangingPunct="1">
+              <a:lnSpc>
+                <a:spcPct val="100000"/>
+              </a:lnSpc>
+              <a:spcBef>
+                <a:spcPts val="0"/>
+              </a:spcBef>
+              <a:spcAft>
+                <a:spcPts val="0"/>
+              </a:spcAft>
+              <a:buClrTx/>
+              <a:buSzTx/>
+              <a:buFontTx/>
+              <a:buNone/>
+              <a:tabLst/>
+              <a:defRPr/>
+            </a:pPr>
+            <a:endParaRPr lang="en-US" dirty="0"/>
+          </a:p>
+        </p:txBody>
+      </p:sp>
+      <p:sp>
+        <p:nvSpPr>
+          <p:cNvPr id="4" name="Slide Number Placeholder 3"/>
+          <p:cNvSpPr>
+            <a:spLocks noGrp="1"/>
+          </p:cNvSpPr>
+          <p:nvPr>
+            <p:ph type="sldNum" sz="quarter" idx="10"/>
+          </p:nvPr>
+        </p:nvSpPr>
+        <p:spPr/>
+        <p:txBody>
+          <a:bodyPr/>
+          <a:lstStyle/>
+          <a:p>
+            <a:fld id="{A9BD41C3-251C-A347-8A21-AED582F5726E}" type="slidenum">
+              <a:rPr lang="en-US" smtClean="0">
+                <a:solidFill>
+                  <a:prstClr val="black"/>
+                </a:solidFill>
+              </a:rPr>
+              <a:pPr/>
               <a:t>6</a:t>
             </a:fld>
             <a:endParaRPr lang="en-US">
@@ -1852,6 +2329,276 @@
     <p:extLst>
       <p:ext uri="{BB962C8B-B14F-4D97-AF65-F5344CB8AC3E}">
         <p14:creationId xmlns:p14="http://schemas.microsoft.com/office/powerpoint/2010/main" val="1379355316"/>
+      </p:ext>
+    </p:extLst>
+  </p:cSld>
+  <p:clrMapOvr>
+    <a:masterClrMapping/>
+  </p:clrMapOvr>
+</p:notes>
+</file>
+
+<file path=ppt/notesSlides/notesSlide7.xml><?xml version="1.0" encoding="utf-8"?>
+<p:notes xmlns:a="http://schemas.openxmlformats.org/drawingml/2006/main" xmlns:r="http://schemas.openxmlformats.org/officeDocument/2006/relationships" xmlns:p="http://schemas.openxmlformats.org/presentationml/2006/main">
+  <p:cSld>
+    <p:spTree>
+      <p:nvGrpSpPr>
+        <p:cNvPr id="1" name=""/>
+        <p:cNvGrpSpPr/>
+        <p:nvPr/>
+      </p:nvGrpSpPr>
+      <p:grpSpPr>
+        <a:xfrm>
+          <a:off x="0" y="0"/>
+          <a:ext cx="0" cy="0"/>
+          <a:chOff x="0" y="0"/>
+          <a:chExt cx="0" cy="0"/>
+        </a:xfrm>
+      </p:grpSpPr>
+      <p:sp>
+        <p:nvSpPr>
+          <p:cNvPr id="2" name="Slide Image Placeholder 1"/>
+          <p:cNvSpPr>
+            <a:spLocks noGrp="1" noRot="1" noChangeAspect="1"/>
+          </p:cNvSpPr>
+          <p:nvPr>
+            <p:ph type="sldImg"/>
+          </p:nvPr>
+        </p:nvSpPr>
+        <p:spPr/>
+      </p:sp>
+      <p:sp>
+        <p:nvSpPr>
+          <p:cNvPr id="3" name="Notes Placeholder 2"/>
+          <p:cNvSpPr>
+            <a:spLocks noGrp="1"/>
+          </p:cNvSpPr>
+          <p:nvPr>
+            <p:ph type="body" idx="1"/>
+          </p:nvPr>
+        </p:nvSpPr>
+        <p:spPr/>
+        <p:txBody>
+          <a:bodyPr/>
+          <a:lstStyle/>
+          <a:p>
+            <a:endParaRPr lang="en-US"/>
+          </a:p>
+        </p:txBody>
+      </p:sp>
+      <p:sp>
+        <p:nvSpPr>
+          <p:cNvPr id="4" name="Slide Number Placeholder 3"/>
+          <p:cNvSpPr>
+            <a:spLocks noGrp="1"/>
+          </p:cNvSpPr>
+          <p:nvPr>
+            <p:ph type="sldNum" sz="quarter" idx="10"/>
+          </p:nvPr>
+        </p:nvSpPr>
+        <p:spPr/>
+        <p:txBody>
+          <a:bodyPr/>
+          <a:lstStyle/>
+          <a:p>
+            <a:pPr>
+              <a:defRPr/>
+            </a:pPr>
+            <a:fld id="{6122490E-C14D-4509-A7F9-FC7223F2C851}" type="slidenum">
+              <a:rPr lang="en-US" smtClean="0"/>
+              <a:pPr>
+                <a:defRPr/>
+              </a:pPr>
+              <a:t>7</a:t>
+            </a:fld>
+            <a:endParaRPr lang="en-US" dirty="0"/>
+          </a:p>
+        </p:txBody>
+      </p:sp>
+    </p:spTree>
+    <p:extLst>
+      <p:ext uri="{BB962C8B-B14F-4D97-AF65-F5344CB8AC3E}">
+        <p14:creationId xmlns:p14="http://schemas.microsoft.com/office/powerpoint/2010/main" val="895265331"/>
+      </p:ext>
+    </p:extLst>
+  </p:cSld>
+  <p:clrMapOvr>
+    <a:masterClrMapping/>
+  </p:clrMapOvr>
+</p:notes>
+</file>
+
+<file path=ppt/notesSlides/notesSlide8.xml><?xml version="1.0" encoding="utf-8"?>
+<p:notes xmlns:a="http://schemas.openxmlformats.org/drawingml/2006/main" xmlns:r="http://schemas.openxmlformats.org/officeDocument/2006/relationships" xmlns:p="http://schemas.openxmlformats.org/presentationml/2006/main">
+  <p:cSld>
+    <p:spTree>
+      <p:nvGrpSpPr>
+        <p:cNvPr id="1" name=""/>
+        <p:cNvGrpSpPr/>
+        <p:nvPr/>
+      </p:nvGrpSpPr>
+      <p:grpSpPr>
+        <a:xfrm>
+          <a:off x="0" y="0"/>
+          <a:ext cx="0" cy="0"/>
+          <a:chOff x="0" y="0"/>
+          <a:chExt cx="0" cy="0"/>
+        </a:xfrm>
+      </p:grpSpPr>
+      <p:sp>
+        <p:nvSpPr>
+          <p:cNvPr id="2" name="Slide Image Placeholder 1"/>
+          <p:cNvSpPr>
+            <a:spLocks noGrp="1" noRot="1" noChangeAspect="1"/>
+          </p:cNvSpPr>
+          <p:nvPr>
+            <p:ph type="sldImg"/>
+          </p:nvPr>
+        </p:nvSpPr>
+        <p:spPr/>
+      </p:sp>
+      <p:sp>
+        <p:nvSpPr>
+          <p:cNvPr id="3" name="Notes Placeholder 2"/>
+          <p:cNvSpPr>
+            <a:spLocks noGrp="1"/>
+          </p:cNvSpPr>
+          <p:nvPr>
+            <p:ph type="body" idx="1"/>
+          </p:nvPr>
+        </p:nvSpPr>
+        <p:spPr/>
+        <p:txBody>
+          <a:bodyPr/>
+          <a:lstStyle/>
+          <a:p>
+            <a:endParaRPr lang="en-US"/>
+          </a:p>
+        </p:txBody>
+      </p:sp>
+      <p:sp>
+        <p:nvSpPr>
+          <p:cNvPr id="4" name="Slide Number Placeholder 3"/>
+          <p:cNvSpPr>
+            <a:spLocks noGrp="1"/>
+          </p:cNvSpPr>
+          <p:nvPr>
+            <p:ph type="sldNum" sz="quarter" idx="10"/>
+          </p:nvPr>
+        </p:nvSpPr>
+        <p:spPr/>
+        <p:txBody>
+          <a:bodyPr/>
+          <a:lstStyle/>
+          <a:p>
+            <a:pPr>
+              <a:defRPr/>
+            </a:pPr>
+            <a:fld id="{6122490E-C14D-4509-A7F9-FC7223F2C851}" type="slidenum">
+              <a:rPr lang="en-US" smtClean="0"/>
+              <a:pPr>
+                <a:defRPr/>
+              </a:pPr>
+              <a:t>8</a:t>
+            </a:fld>
+            <a:endParaRPr lang="en-US" dirty="0"/>
+          </a:p>
+        </p:txBody>
+      </p:sp>
+    </p:spTree>
+    <p:extLst>
+      <p:ext uri="{BB962C8B-B14F-4D97-AF65-F5344CB8AC3E}">
+        <p14:creationId xmlns:p14="http://schemas.microsoft.com/office/powerpoint/2010/main" val="2970240131"/>
+      </p:ext>
+    </p:extLst>
+  </p:cSld>
+  <p:clrMapOvr>
+    <a:masterClrMapping/>
+  </p:clrMapOvr>
+</p:notes>
+</file>
+
+<file path=ppt/notesSlides/notesSlide9.xml><?xml version="1.0" encoding="utf-8"?>
+<p:notes xmlns:a="http://schemas.openxmlformats.org/drawingml/2006/main" xmlns:r="http://schemas.openxmlformats.org/officeDocument/2006/relationships" xmlns:p="http://schemas.openxmlformats.org/presentationml/2006/main">
+  <p:cSld>
+    <p:spTree>
+      <p:nvGrpSpPr>
+        <p:cNvPr id="1" name=""/>
+        <p:cNvGrpSpPr/>
+        <p:nvPr/>
+      </p:nvGrpSpPr>
+      <p:grpSpPr>
+        <a:xfrm>
+          <a:off x="0" y="0"/>
+          <a:ext cx="0" cy="0"/>
+          <a:chOff x="0" y="0"/>
+          <a:chExt cx="0" cy="0"/>
+        </a:xfrm>
+      </p:grpSpPr>
+      <p:sp>
+        <p:nvSpPr>
+          <p:cNvPr id="2" name="Slide Image Placeholder 1"/>
+          <p:cNvSpPr>
+            <a:spLocks noGrp="1" noRot="1" noChangeAspect="1"/>
+          </p:cNvSpPr>
+          <p:nvPr>
+            <p:ph type="sldImg"/>
+          </p:nvPr>
+        </p:nvSpPr>
+        <p:spPr/>
+      </p:sp>
+      <p:sp>
+        <p:nvSpPr>
+          <p:cNvPr id="3" name="Notes Placeholder 2"/>
+          <p:cNvSpPr>
+            <a:spLocks noGrp="1"/>
+          </p:cNvSpPr>
+          <p:nvPr>
+            <p:ph type="body" idx="1"/>
+          </p:nvPr>
+        </p:nvSpPr>
+        <p:spPr/>
+        <p:txBody>
+          <a:bodyPr/>
+          <a:lstStyle/>
+          <a:p>
+            <a:endParaRPr lang="en-US"/>
+          </a:p>
+        </p:txBody>
+      </p:sp>
+      <p:sp>
+        <p:nvSpPr>
+          <p:cNvPr id="4" name="Slide Number Placeholder 3"/>
+          <p:cNvSpPr>
+            <a:spLocks noGrp="1"/>
+          </p:cNvSpPr>
+          <p:nvPr>
+            <p:ph type="sldNum" sz="quarter" idx="10"/>
+          </p:nvPr>
+        </p:nvSpPr>
+        <p:spPr/>
+        <p:txBody>
+          <a:bodyPr/>
+          <a:lstStyle/>
+          <a:p>
+            <a:pPr>
+              <a:defRPr/>
+            </a:pPr>
+            <a:fld id="{6122490E-C14D-4509-A7F9-FC7223F2C851}" type="slidenum">
+              <a:rPr lang="en-US" smtClean="0"/>
+              <a:pPr>
+                <a:defRPr/>
+              </a:pPr>
+              <a:t>9</a:t>
+            </a:fld>
+            <a:endParaRPr lang="en-US" dirty="0"/>
+          </a:p>
+        </p:txBody>
+      </p:sp>
+    </p:spTree>
+    <p:extLst>
+      <p:ext uri="{BB962C8B-B14F-4D97-AF65-F5344CB8AC3E}">
+        <p14:creationId xmlns:p14="http://schemas.microsoft.com/office/powerpoint/2010/main" val="2690825740"/>
       </p:ext>
     </p:extLst>
   </p:cSld>
@@ -3025,7 +3772,6 @@
               <a:rPr lang="en-US" dirty="0" smtClean="0"/>
               <a:t>would be helpful?</a:t>
             </a:r>
-            <a:endParaRPr lang="en-US" dirty="0" smtClean="0"/>
           </a:p>
         </p:txBody>
       </p:sp>
@@ -3038,7 +3784,7 @@
           <p:nvPr/>
         </p:nvPicPr>
         <p:blipFill>
-          <a:blip r:embed="rId2">
+          <a:blip r:embed="rId3">
             <a:extLst>
               <a:ext uri="{28A0092B-C50C-407E-A947-70E740481C1C}">
                 <a14:useLocalDpi xmlns:a14="http://schemas.microsoft.com/office/drawing/2010/main" val="0"/>
@@ -3138,7 +3884,6 @@
               <a:rPr lang="en-US" dirty="0" smtClean="0"/>
               <a:t>“Surface Testing” Revisited</a:t>
             </a:r>
-            <a:endParaRPr lang="en-US" dirty="0" smtClean="0"/>
           </a:p>
           <a:p>
             <a:pPr lvl="1"/>
@@ -3146,7 +3891,6 @@
               <a:rPr lang="en-US" dirty="0" smtClean="0"/>
               <a:t>ORM Interface Surface</a:t>
             </a:r>
-            <a:endParaRPr lang="en-US" dirty="0" smtClean="0"/>
           </a:p>
           <a:p>
             <a:endParaRPr lang="en-US" dirty="0" smtClean="0"/>
@@ -3162,11 +3906,7 @@
             <a:pPr lvl="1"/>
             <a:r>
               <a:rPr lang="en-US" dirty="0" smtClean="0"/>
-              <a:t>Independently Controls </a:t>
-            </a:r>
-            <a:r>
-              <a:rPr lang="en-US" dirty="0" smtClean="0"/>
-              <a:t>the </a:t>
+              <a:t>Independently Controls the </a:t>
             </a:r>
             <a:br>
               <a:rPr lang="en-US" dirty="0" smtClean="0"/>
@@ -3188,7 +3928,7 @@
           <p:nvPr/>
         </p:nvPicPr>
         <p:blipFill>
-          <a:blip r:embed="rId2">
+          <a:blip r:embed="rId3">
             <a:extLst>
               <a:ext uri="{28A0092B-C50C-407E-A947-70E740481C1C}">
                 <a14:useLocalDpi xmlns:a14="http://schemas.microsoft.com/office/drawing/2010/main" val="0"/>
@@ -3583,7 +4323,7 @@
           </p:nvPr>
         </p:nvPicPr>
         <p:blipFill>
-          <a:blip r:embed="rId2">
+          <a:blip r:embed="rId3">
             <a:extLst>
               <a:ext uri="{28A0092B-C50C-407E-A947-70E740481C1C}">
                 <a14:useLocalDpi xmlns:a14="http://schemas.microsoft.com/office/drawing/2010/main" val="0"/>
@@ -3672,7 +4412,7 @@
           </p:nvPr>
         </p:nvPicPr>
         <p:blipFill>
-          <a:blip r:embed="rId2" cstate="print">
+          <a:blip r:embed="rId3" cstate="print">
             <a:extLst>
               <a:ext uri="{28A0092B-C50C-407E-A947-70E740481C1C}">
                 <a14:useLocalDpi xmlns:a14="http://schemas.microsoft.com/office/drawing/2010/main" val="0"/>
@@ -3842,15 +4582,7 @@
           <a:p>
             <a:r>
               <a:rPr lang="en-US" dirty="0" smtClean="0"/>
-              <a:t>More Shameless </a:t>
-            </a:r>
-            <a:r>
-              <a:rPr lang="en-US" dirty="0" smtClean="0"/>
-              <a:t>Self </a:t>
-            </a:r>
-            <a:r>
-              <a:rPr lang="en-US" dirty="0" smtClean="0"/>
-              <a:t>Promotion</a:t>
+              <a:t>More Shameless Self Promotion</a:t>
             </a:r>
             <a:endParaRPr lang="en-US" dirty="0"/>
           </a:p>
@@ -3882,11 +4614,7 @@
           <a:p>
             <a:r>
               <a:rPr lang="en-US" dirty="0" smtClean="0"/>
-              <a:t>Twitter</a:t>
-            </a:r>
-            <a:r>
-              <a:rPr lang="en-US" dirty="0" smtClean="0"/>
-              <a:t>:	@</a:t>
+              <a:t>Twitter:	@</a:t>
             </a:r>
             <a:r>
               <a:rPr lang="en-US" dirty="0" err="1" smtClean="0"/>
@@ -3900,11 +4628,7 @@
           <a:p>
             <a:r>
               <a:rPr lang="en-US" dirty="0" smtClean="0"/>
-              <a:t>Blog</a:t>
-            </a:r>
-            <a:r>
-              <a:rPr lang="en-US" dirty="0" smtClean="0"/>
-              <a:t>:	http://ruthlesslyhelpful.net</a:t>
+              <a:t>Blog:	http://ruthlesslyhelpful.net</a:t>
             </a:r>
           </a:p>
           <a:p>
@@ -4011,7 +4735,7 @@
           </p:nvPr>
         </p:nvPicPr>
         <p:blipFill>
-          <a:blip r:embed="rId2">
+          <a:blip r:embed="rId3">
             <a:extLst>
               <a:ext uri="{28A0092B-C50C-407E-A947-70E740481C1C}">
                 <a14:useLocalDpi xmlns:a14="http://schemas.microsoft.com/office/drawing/2010/main" val="0"/>
@@ -4150,7 +4874,6 @@
               <a:rPr lang="en-US" dirty="0" smtClean="0"/>
               <a:t>Triggers !?!</a:t>
             </a:r>
-            <a:endParaRPr lang="en-US" dirty="0" smtClean="0"/>
           </a:p>
         </p:txBody>
       </p:sp>
@@ -4286,7 +5009,6 @@
               <a:rPr lang="en-US" dirty="0" smtClean="0"/>
               <a:t>”</a:t>
             </a:r>
-            <a:endParaRPr lang="en-US" dirty="0" smtClean="0"/>
           </a:p>
         </p:txBody>
       </p:sp>
@@ -4805,7 +5527,6 @@
               <a:rPr lang="en-US" dirty="0" smtClean="0"/>
               <a:t> work?</a:t>
             </a:r>
-            <a:endParaRPr lang="en-US" dirty="0" smtClean="0"/>
           </a:p>
           <a:p>
             <a:endParaRPr lang="en-US" dirty="0"/>
@@ -4878,7 +5599,6 @@
               <a:rPr lang="en-US" dirty="0"/>
               <a:t>Unit Testing Databases Is Difficult</a:t>
             </a:r>
-            <a:endParaRPr lang="en-US" dirty="0"/>
           </a:p>
         </p:txBody>
       </p:sp>
@@ -5027,7 +5747,6 @@
               <a:rPr lang="en-US" dirty="0"/>
               <a:t> Difficult</a:t>
             </a:r>
-            <a:endParaRPr lang="en-US" dirty="0"/>
           </a:p>
         </p:txBody>
       </p:sp>
@@ -6517,12 +7236,7 @@
 </file>
 
 <file path=customXml/item1.xml><?xml version="1.0" encoding="utf-8"?>
-<?mso-contentType ?>
-<FormTemplates xmlns="http://schemas.microsoft.com/sharepoint/v3/contenttype/forms">
-  <Display>DocumentLibraryForm</Display>
-  <Edit>DocumentLibraryForm</Edit>
-  <New>DocumentLibraryForm</New>
-</FormTemplates>
+<LongProperties xmlns="http://schemas.microsoft.com/office/2006/metadata/longProperties"/>
 </file>
 
 <file path=customXml/item2.xml><?xml version="1.0" encoding="utf-8"?>
@@ -6532,7 +7246,12 @@
 </file>
 
 <file path=customXml/item3.xml><?xml version="1.0" encoding="utf-8"?>
-<LongProperties xmlns="http://schemas.microsoft.com/office/2006/metadata/longProperties"/>
+<?mso-contentType ?>
+<FormTemplates xmlns="http://schemas.microsoft.com/sharepoint/v3/contenttype/forms">
+  <Display>DocumentLibraryForm</Display>
+  <Edit>DocumentLibraryForm</Edit>
+  <New>DocumentLibraryForm</New>
+</FormTemplates>
 </file>
 
 <file path=customXml/item4.xml><?xml version="1.0" encoding="utf-8"?>
@@ -6585,9 +7304,9 @@
 </file>
 
 <file path=customXml/itemProps1.xml><?xml version="1.0" encoding="utf-8"?>
-<ds:datastoreItem xmlns:ds="http://schemas.openxmlformats.org/officeDocument/2006/customXml" ds:itemID="{6B6AE0AA-FA39-478D-9CD3-6A3092A1C572}">
+<ds:datastoreItem xmlns:ds="http://schemas.openxmlformats.org/officeDocument/2006/customXml" ds:itemID="{C13986F2-2813-470E-828A-8D5702178ABB}">
   <ds:schemaRefs>
-    <ds:schemaRef ds:uri="http://schemas.microsoft.com/sharepoint/v3/contenttype/forms"/>
+    <ds:schemaRef ds:uri="http://schemas.microsoft.com/office/2006/metadata/longProperties"/>
   </ds:schemaRefs>
 </ds:datastoreItem>
 </file>
@@ -6607,9 +7326,9 @@
 </file>
 
 <file path=customXml/itemProps3.xml><?xml version="1.0" encoding="utf-8"?>
-<ds:datastoreItem xmlns:ds="http://schemas.openxmlformats.org/officeDocument/2006/customXml" ds:itemID="{C13986F2-2813-470E-828A-8D5702178ABB}">
+<ds:datastoreItem xmlns:ds="http://schemas.openxmlformats.org/officeDocument/2006/customXml" ds:itemID="{6B6AE0AA-FA39-478D-9CD3-6A3092A1C572}">
   <ds:schemaRefs>
-    <ds:schemaRef ds:uri="http://schemas.microsoft.com/office/2006/metadata/longProperties"/>
+    <ds:schemaRef ds:uri="http://schemas.microsoft.com/sharepoint/v3/contenttype/forms"/>
   </ds:schemaRefs>
 </ds:datastoreItem>
 </file>

</xml_diff>